<commit_message>
Changes in slide 3, code added with 3 Testcases, all TC have the minimum cost calculated by me
</commit_message>
<xml_diff>
--- a/Assignment-06/Assignment_6.pptx
+++ b/Assignment-06/Assignment_6.pptx
@@ -8237,7 +8237,7 @@
             <a:tbl>
               <a:tblPr>
                 <a:noFill/>
-                <a:tableStyleId>{A0EBFCF8-4709-4AED-83A0-A707A9E2DBE8}</a:tableStyleId>
+                <a:tableStyleId>{363C8E31-8DAD-463B-BBE8-2774DD5F8D5D}</a:tableStyleId>
               </a:tblPr>
               <a:tblGrid>
                 <a:gridCol w="587825"/>
@@ -8546,7 +8546,7 @@
             <a:tbl>
               <a:tblPr>
                 <a:noFill/>
-                <a:tableStyleId>{A0EBFCF8-4709-4AED-83A0-A707A9E2DBE8}</a:tableStyleId>
+                <a:tableStyleId>{363C8E31-8DAD-463B-BBE8-2774DD5F8D5D}</a:tableStyleId>
               </a:tblPr>
               <a:tblGrid>
                 <a:gridCol w="529200"/>
@@ -9077,7 +9077,7 @@
             <a:tbl>
               <a:tblPr>
                 <a:noFill/>
-                <a:tableStyleId>{A0EBFCF8-4709-4AED-83A0-A707A9E2DBE8}</a:tableStyleId>
+                <a:tableStyleId>{363C8E31-8DAD-463B-BBE8-2774DD5F8D5D}</a:tableStyleId>
               </a:tblPr>
               <a:tblGrid>
                 <a:gridCol w="587825"/>
@@ -9386,7 +9386,7 @@
             <a:tbl>
               <a:tblPr>
                 <a:noFill/>
-                <a:tableStyleId>{A0EBFCF8-4709-4AED-83A0-A707A9E2DBE8}</a:tableStyleId>
+                <a:tableStyleId>{363C8E31-8DAD-463B-BBE8-2774DD5F8D5D}</a:tableStyleId>
               </a:tblPr>
               <a:tblGrid>
                 <a:gridCol w="529200"/>
@@ -10050,7 +10050,7 @@
             <a:tbl>
               <a:tblPr>
                 <a:noFill/>
-                <a:tableStyleId>{A0EBFCF8-4709-4AED-83A0-A707A9E2DBE8}</a:tableStyleId>
+                <a:tableStyleId>{363C8E31-8DAD-463B-BBE8-2774DD5F8D5D}</a:tableStyleId>
               </a:tblPr>
               <a:tblGrid>
                 <a:gridCol w="587825"/>
@@ -10359,7 +10359,7 @@
             <a:tbl>
               <a:tblPr>
                 <a:noFill/>
-                <a:tableStyleId>{A0EBFCF8-4709-4AED-83A0-A707A9E2DBE8}</a:tableStyleId>
+                <a:tableStyleId>{363C8E31-8DAD-463B-BBE8-2774DD5F8D5D}</a:tableStyleId>
               </a:tblPr>
               <a:tblGrid>
                 <a:gridCol w="529200"/>
@@ -11132,7 +11132,7 @@
             <a:tbl>
               <a:tblPr>
                 <a:noFill/>
-                <a:tableStyleId>{A0EBFCF8-4709-4AED-83A0-A707A9E2DBE8}</a:tableStyleId>
+                <a:tableStyleId>{363C8E31-8DAD-463B-BBE8-2774DD5F8D5D}</a:tableStyleId>
               </a:tblPr>
               <a:tblGrid>
                 <a:gridCol w="587825"/>
@@ -11441,7 +11441,7 @@
             <a:tbl>
               <a:tblPr>
                 <a:noFill/>
-                <a:tableStyleId>{A0EBFCF8-4709-4AED-83A0-A707A9E2DBE8}</a:tableStyleId>
+                <a:tableStyleId>{363C8E31-8DAD-463B-BBE8-2774DD5F8D5D}</a:tableStyleId>
               </a:tblPr>
               <a:tblGrid>
                 <a:gridCol w="529200"/>
@@ -12335,7 +12335,7 @@
             <a:tbl>
               <a:tblPr>
                 <a:noFill/>
-                <a:tableStyleId>{A0EBFCF8-4709-4AED-83A0-A707A9E2DBE8}</a:tableStyleId>
+                <a:tableStyleId>{363C8E31-8DAD-463B-BBE8-2774DD5F8D5D}</a:tableStyleId>
               </a:tblPr>
               <a:tblGrid>
                 <a:gridCol w="587825"/>
@@ -12644,7 +12644,7 @@
             <a:tbl>
               <a:tblPr>
                 <a:noFill/>
-                <a:tableStyleId>{A0EBFCF8-4709-4AED-83A0-A707A9E2DBE8}</a:tableStyleId>
+                <a:tableStyleId>{363C8E31-8DAD-463B-BBE8-2774DD5F8D5D}</a:tableStyleId>
               </a:tblPr>
               <a:tblGrid>
                 <a:gridCol w="529200"/>
@@ -13659,7 +13659,7 @@
             <a:tbl>
               <a:tblPr>
                 <a:noFill/>
-                <a:tableStyleId>{A0EBFCF8-4709-4AED-83A0-A707A9E2DBE8}</a:tableStyleId>
+                <a:tableStyleId>{363C8E31-8DAD-463B-BBE8-2774DD5F8D5D}</a:tableStyleId>
               </a:tblPr>
               <a:tblGrid>
                 <a:gridCol w="587825"/>
@@ -13968,7 +13968,7 @@
             <a:tbl>
               <a:tblPr>
                 <a:noFill/>
-                <a:tableStyleId>{A0EBFCF8-4709-4AED-83A0-A707A9E2DBE8}</a:tableStyleId>
+                <a:tableStyleId>{363C8E31-8DAD-463B-BBE8-2774DD5F8D5D}</a:tableStyleId>
               </a:tblPr>
               <a:tblGrid>
                 <a:gridCol w="529200"/>
@@ -15104,7 +15104,7 @@
             <a:tbl>
               <a:tblPr>
                 <a:noFill/>
-                <a:tableStyleId>{A0EBFCF8-4709-4AED-83A0-A707A9E2DBE8}</a:tableStyleId>
+                <a:tableStyleId>{363C8E31-8DAD-463B-BBE8-2774DD5F8D5D}</a:tableStyleId>
               </a:tblPr>
               <a:tblGrid>
                 <a:gridCol w="587825"/>
@@ -15413,7 +15413,7 @@
             <a:tbl>
               <a:tblPr>
                 <a:noFill/>
-                <a:tableStyleId>{A0EBFCF8-4709-4AED-83A0-A707A9E2DBE8}</a:tableStyleId>
+                <a:tableStyleId>{363C8E31-8DAD-463B-BBE8-2774DD5F8D5D}</a:tableStyleId>
               </a:tblPr>
               <a:tblGrid>
                 <a:gridCol w="529200"/>
@@ -16193,7 +16193,7 @@
         </p:nvSpPr>
         <p:spPr>
           <a:xfrm>
-            <a:off x="460950" y="543525"/>
+            <a:off x="521625" y="664825"/>
             <a:ext cx="8520600" cy="572700"/>
           </a:xfrm>
           <a:prstGeom prst="rect">
@@ -16242,7 +16242,7 @@
         </p:nvSpPr>
         <p:spPr>
           <a:xfrm>
-            <a:off x="460950" y="1688225"/>
+            <a:off x="460950" y="1979375"/>
             <a:ext cx="8222100" cy="2710200"/>
           </a:xfrm>
           <a:prstGeom prst="rect">
@@ -16270,7 +16270,7 @@
                   <a:srgbClr val="434343"/>
                 </a:solidFill>
               </a:rPr>
-              <a:t>Spanning tree is sub-graph of a graph. It has</a:t>
+              <a:t>Spanning tree is subset of a graph. It has</a:t>
             </a:r>
             <a:r>
               <a:rPr lang="en">
@@ -16278,7 +16278,7 @@
                   <a:srgbClr val="434343"/>
                 </a:solidFill>
               </a:rPr>
-              <a:t> one less edge than the original graph and </a:t>
+              <a:t> </a:t>
             </a:r>
             <a:r>
               <a:rPr lang="en">
@@ -16286,7 +16286,7 @@
                   <a:srgbClr val="434343"/>
                 </a:solidFill>
               </a:rPr>
-              <a:t>same number of vertices as that of original graph. </a:t>
+              <a:t>same number of vertices(v) as that of original graph and number of edges are (v-1).</a:t>
             </a:r>
             <a:endParaRPr>
               <a:solidFill>
@@ -16296,6 +16296,28 @@
           </a:p>
           <a:p>
             <a:pPr indent="0" lvl="0" marL="0" rtl="0" algn="l">
+              <a:lnSpc>
+                <a:spcPct val="50000"/>
+              </a:lnSpc>
+              <a:spcBef>
+                <a:spcPts val="1200"/>
+              </a:spcBef>
+              <a:spcAft>
+                <a:spcPts val="0"/>
+              </a:spcAft>
+              <a:buNone/>
+            </a:pPr>
+            <a:r>
+              <a:t/>
+            </a:r>
+            <a:endParaRPr sz="500">
+              <a:solidFill>
+                <a:srgbClr val="434343"/>
+              </a:solidFill>
+            </a:endParaRPr>
+          </a:p>
+          <a:p>
+            <a:pPr indent="0" lvl="0" marL="0" rtl="0" algn="l">
               <a:spcBef>
                 <a:spcPts val="1200"/>
               </a:spcBef>
@@ -16310,39 +16332,7 @@
                   <a:srgbClr val="434343"/>
                 </a:solidFill>
               </a:rPr>
-              <a:t>There are </a:t>
-            </a:r>
-            <a:r>
-              <a:rPr baseline="30000" lang="en">
-                <a:solidFill>
-                  <a:srgbClr val="434343"/>
-                </a:solidFill>
-              </a:rPr>
-              <a:t>|E|</a:t>
-            </a:r>
-            <a:r>
-              <a:rPr lang="en">
-                <a:solidFill>
-                  <a:srgbClr val="434343"/>
-                </a:solidFill>
-              </a:rPr>
-              <a:t> C </a:t>
-            </a:r>
-            <a:r>
-              <a:rPr baseline="-25000" lang="en">
-                <a:solidFill>
-                  <a:srgbClr val="434343"/>
-                </a:solidFill>
-              </a:rPr>
-              <a:t>|V|-1  </a:t>
-            </a:r>
-            <a:r>
-              <a:rPr lang="en">
-                <a:solidFill>
-                  <a:srgbClr val="434343"/>
-                </a:solidFill>
-              </a:rPr>
-              <a:t>- number of cycles, spanning trees (where |E| is number of edges and |V| is number of vertices) if there is no cycle in the graph. When there are multiple cycles in the graph and number of edges are greater than 4 then number of spanning trees decreases.</a:t>
+              <a:t>There can more than 1 Minimum spanning trees for a single graph and those MST would have same cost.</a:t>
             </a:r>
             <a:endParaRPr>
               <a:solidFill>
@@ -16366,9 +16356,65 @@
                   <a:srgbClr val="434343"/>
                 </a:solidFill>
               </a:rPr>
-              <a:t>Minimum cost spanning tree is a spanning tree (of a weighted graph) whose cost is minimum where cost(Edge1 , Edge2) is the weight if the edge between Edge1 and Edge2.</a:t>
+              <a:t>Minimum cost spanning tree is a spanning tree (of a weighted graph) whose cost is minimum where cost(vertex</a:t>
             </a:r>
-            <a:endParaRPr>
+            <a:r>
+              <a:rPr baseline="-25000" lang="en">
+                <a:solidFill>
+                  <a:srgbClr val="434343"/>
+                </a:solidFill>
+              </a:rPr>
+              <a:t>1</a:t>
+            </a:r>
+            <a:r>
+              <a:rPr lang="en">
+                <a:solidFill>
+                  <a:srgbClr val="434343"/>
+                </a:solidFill>
+              </a:rPr>
+              <a:t> ,vertex</a:t>
+            </a:r>
+            <a:r>
+              <a:rPr baseline="-25000" lang="en">
+                <a:solidFill>
+                  <a:srgbClr val="434343"/>
+                </a:solidFill>
+              </a:rPr>
+              <a:t>2</a:t>
+            </a:r>
+            <a:r>
+              <a:rPr lang="en">
+                <a:solidFill>
+                  <a:srgbClr val="434343"/>
+                </a:solidFill>
+              </a:rPr>
+              <a:t>) is the weight if there exists an edge between vertex</a:t>
+            </a:r>
+            <a:r>
+              <a:rPr baseline="-25000" lang="en">
+                <a:solidFill>
+                  <a:srgbClr val="434343"/>
+                </a:solidFill>
+              </a:rPr>
+              <a:t>1</a:t>
+            </a:r>
+            <a:r>
+              <a:rPr lang="en">
+                <a:solidFill>
+                  <a:srgbClr val="434343"/>
+                </a:solidFill>
+              </a:rPr>
+              <a:t> and vertex</a:t>
+            </a:r>
+            <a:r>
+              <a:rPr baseline="-25000" lang="en">
+                <a:solidFill>
+                  <a:srgbClr val="434343"/>
+                </a:solidFill>
+              </a:rPr>
+              <a:t>2</a:t>
+            </a:r>
+            <a:endParaRPr baseline="-25000">
               <a:solidFill>
                 <a:srgbClr val="666666"/>
               </a:solidFill>

</xml_diff>